<commit_message>
minor fix to first presentaiton
</commit_message>
<xml_diff>
--- a/training-spark/0_Intro_v1.pptx
+++ b/training-spark/0_Intro_v1.pptx
@@ -445,7 +445,7 @@
           <a:p>
             <a:fld id="{154C1C9F-968B-45D4-9FBD-EA39F2175159}" type="datetimeFigureOut">
               <a:rPr lang="en-US" smtClean="0"/>
-              <a:t>2022-09-03</a:t>
+              <a:t>2022-09-10</a:t>
             </a:fld>
             <a:endParaRPr lang="en-US"/>
           </a:p>
@@ -1803,7 +1803,7 @@
           <a:p>
             <a:fld id="{0F1B7D9C-4F60-C246-8CA4-396C0346DE33}" type="datetimeFigureOut">
               <a:rPr lang="it-IT" smtClean="0"/>
-              <a:t>03/09/2022</a:t>
+              <a:t>10/09/2022</a:t>
             </a:fld>
             <a:endParaRPr lang="it-IT"/>
           </a:p>
@@ -2458,7 +2458,7 @@
           <a:p>
             <a:fld id="{A2FF5F4A-4507-894B-98D1-9441DD15C475}" type="datetimeFigureOut">
               <a:rPr lang="it-IT" smtClean="0"/>
-              <a:t>03/09/2022</a:t>
+              <a:t>10/09/2022</a:t>
             </a:fld>
             <a:endParaRPr lang="it-IT" dirty="0"/>
           </a:p>
@@ -5015,19 +5015,15 @@
             </a:r>
             <a:r>
               <a:rPr lang="en-US" dirty="0"/>
-              <a:t>: </a:t>
-            </a:r>
-            <a:r>
-              <a:rPr lang="en-US" strike="sngStrike" dirty="0"/>
-              <a:t>28 </a:t>
-            </a:r>
-            <a:r>
-              <a:rPr lang="en-US" strike="sngStrike" dirty="0" err="1"/>
-              <a:t>settembre</a:t>
+              <a:t>: 17 </a:t>
+            </a:r>
+            <a:r>
+              <a:rPr lang="en-US" dirty="0" err="1"/>
+              <a:t>ottobre</a:t>
             </a:r>
             <a:r>
               <a:rPr lang="en-US" dirty="0"/>
-              <a:t> TBD</a:t>
+              <a:t> (40%)</a:t>
             </a:r>
           </a:p>
           <a:p>
@@ -5037,22 +5033,21 @@
             </a:r>
             <a:r>
               <a:rPr lang="en-US" dirty="0"/>
-              <a:t> finale: </a:t>
-            </a:r>
-            <a:r>
-              <a:rPr lang="en-US" strike="sngStrike" dirty="0"/>
-              <a:t>8 </a:t>
-            </a:r>
-            <a:r>
-              <a:rPr lang="en-US" strike="sngStrike" dirty="0" err="1"/>
+              <a:t> finale: 8 </a:t>
+            </a:r>
+            <a:r>
+              <a:rPr lang="en-US" dirty="0" err="1"/>
               <a:t>novembre</a:t>
             </a:r>
             <a:r>
               <a:rPr lang="en-US" dirty="0"/>
-              <a:t> TBD</a:t>
-            </a:r>
-          </a:p>
-          <a:p>
+              <a:t> (60%)</a:t>
+            </a:r>
+          </a:p>
+          <a:p>
+            <a:pPr marL="0" indent="0">
+              <a:buNone/>
+            </a:pPr>
             <a:endParaRPr lang="en-US" dirty="0"/>
           </a:p>
           <a:p>

</xml_diff>

<commit_message>
update to new course g
</commit_message>
<xml_diff>
--- a/training-spark/0_Intro_v1.pptx
+++ b/training-spark/0_Intro_v1.pptx
@@ -6,10 +6,10 @@
     <p:sldMasterId id="2147483659" r:id="rId2"/>
   </p:sldMasterIdLst>
   <p:notesMasterIdLst>
-    <p:notesMasterId r:id="rId19"/>
+    <p:notesMasterId r:id="rId20"/>
   </p:notesMasterIdLst>
   <p:handoutMasterIdLst>
-    <p:handoutMasterId r:id="rId20"/>
+    <p:handoutMasterId r:id="rId21"/>
   </p:handoutMasterIdLst>
   <p:sldIdLst>
     <p:sldId id="257" r:id="rId3"/>
@@ -24,10 +24,11 @@
     <p:sldId id="266" r:id="rId12"/>
     <p:sldId id="269" r:id="rId13"/>
     <p:sldId id="270" r:id="rId14"/>
-    <p:sldId id="272" r:id="rId15"/>
-    <p:sldId id="273" r:id="rId16"/>
-    <p:sldId id="274" r:id="rId17"/>
-    <p:sldId id="275" r:id="rId18"/>
+    <p:sldId id="276" r:id="rId15"/>
+    <p:sldId id="272" r:id="rId16"/>
+    <p:sldId id="273" r:id="rId17"/>
+    <p:sldId id="274" r:id="rId18"/>
+    <p:sldId id="275" r:id="rId19"/>
   </p:sldIdLst>
   <p:sldSz cx="13004800" cy="9753600"/>
   <p:notesSz cx="6858000" cy="9144000"/>
@@ -445,7 +446,7 @@
           <a:p>
             <a:fld id="{154C1C9F-968B-45D4-9FBD-EA39F2175159}" type="datetimeFigureOut">
               <a:rPr lang="en-US" smtClean="0"/>
-              <a:t>2022-09-11</a:t>
+              <a:t>2023-10-01</a:t>
             </a:fld>
             <a:endParaRPr lang="en-US"/>
           </a:p>
@@ -828,6 +829,102 @@
           <a:bodyPr/>
           <a:lstStyle/>
           <a:p>
+            <a:r>
+              <a:rPr lang="en-US" dirty="0"/>
+              <a:t>Cosa </a:t>
+            </a:r>
+            <a:r>
+              <a:rPr lang="en-US" dirty="0" err="1"/>
+              <a:t>avete</a:t>
+            </a:r>
+            <a:r>
+              <a:rPr lang="en-US" dirty="0"/>
+              <a:t> </a:t>
+            </a:r>
+            <a:r>
+              <a:rPr lang="en-US" dirty="0" err="1"/>
+              <a:t>già</a:t>
+            </a:r>
+            <a:r>
+              <a:rPr lang="en-US" dirty="0"/>
+              <a:t> </a:t>
+            </a:r>
+            <a:r>
+              <a:rPr lang="en-US" dirty="0" err="1"/>
+              <a:t>studiato</a:t>
+            </a:r>
+            <a:r>
+              <a:rPr lang="en-US" dirty="0"/>
+              <a:t> di </a:t>
+            </a:r>
+            <a:r>
+              <a:rPr lang="en-US" dirty="0" err="1"/>
+              <a:t>questo</a:t>
+            </a:r>
+            <a:r>
+              <a:rPr lang="en-US" dirty="0"/>
+              <a:t>?</a:t>
+            </a:r>
+          </a:p>
+        </p:txBody>
+      </p:sp>
+    </p:spTree>
+    <p:extLst>
+      <p:ext uri="{BB962C8B-B14F-4D97-AF65-F5344CB8AC3E}">
+        <p14:creationId xmlns:p14="http://schemas.microsoft.com/office/powerpoint/2010/main" val="2405439319"/>
+      </p:ext>
+    </p:extLst>
+  </p:cSld>
+  <p:clrMapOvr>
+    <a:masterClrMapping/>
+  </p:clrMapOvr>
+</p:notes>
+</file>
+
+<file path=ppt/notesSlides/notesSlide3.xml><?xml version="1.0" encoding="utf-8"?>
+<p:notes xmlns:a="http://schemas.openxmlformats.org/drawingml/2006/main" xmlns:r="http://schemas.openxmlformats.org/officeDocument/2006/relationships" xmlns:p="http://schemas.openxmlformats.org/presentationml/2006/main">
+  <p:cSld>
+    <p:spTree>
+      <p:nvGrpSpPr>
+        <p:cNvPr id="1" name=""/>
+        <p:cNvGrpSpPr/>
+        <p:nvPr/>
+      </p:nvGrpSpPr>
+      <p:grpSpPr>
+        <a:xfrm>
+          <a:off x="0" y="0"/>
+          <a:ext cx="0" cy="0"/>
+          <a:chOff x="0" y="0"/>
+          <a:chExt cx="0" cy="0"/>
+        </a:xfrm>
+      </p:grpSpPr>
+      <p:sp>
+        <p:nvSpPr>
+          <p:cNvPr id="2" name="Slide Image Placeholder 1"/>
+          <p:cNvSpPr>
+            <a:spLocks noGrp="1" noRot="1" noChangeAspect="1"/>
+          </p:cNvSpPr>
+          <p:nvPr>
+            <p:ph type="sldImg"/>
+          </p:nvPr>
+        </p:nvSpPr>
+        <p:spPr/>
+      </p:sp>
+      <p:sp>
+        <p:nvSpPr>
+          <p:cNvPr id="3" name="Notes Placeholder 2"/>
+          <p:cNvSpPr>
+            <a:spLocks noGrp="1"/>
+          </p:cNvSpPr>
+          <p:nvPr>
+            <p:ph type="body" idx="1"/>
+          </p:nvPr>
+        </p:nvSpPr>
+        <p:spPr/>
+        <p:txBody>
+          <a:bodyPr/>
+          <a:lstStyle/>
+          <a:p>
             <a:pPr marL="0" marR="0" lvl="0" indent="0" algn="l" rtl="0">
               <a:lnSpc>
                 <a:spcPct val="160000"/>
@@ -996,7 +1093,7 @@
 </p:notes>
 </file>
 
-<file path=ppt/notesSlides/notesSlide3.xml><?xml version="1.0" encoding="utf-8"?>
+<file path=ppt/notesSlides/notesSlide4.xml><?xml version="1.0" encoding="utf-8"?>
 <p:notes xmlns:a="http://schemas.openxmlformats.org/drawingml/2006/main" xmlns:r="http://schemas.openxmlformats.org/officeDocument/2006/relationships" xmlns:p="http://schemas.openxmlformats.org/presentationml/2006/main">
   <p:cSld>
     <p:spTree>
@@ -1803,7 +1900,7 @@
           <a:p>
             <a:fld id="{0F1B7D9C-4F60-C246-8CA4-396C0346DE33}" type="datetimeFigureOut">
               <a:rPr lang="it-IT" smtClean="0"/>
-              <a:t>11/09/2022</a:t>
+              <a:t>01/10/2023</a:t>
             </a:fld>
             <a:endParaRPr lang="it-IT"/>
           </a:p>
@@ -2458,7 +2555,7 @@
           <a:p>
             <a:fld id="{A2FF5F4A-4507-894B-98D1-9441DD15C475}" type="datetimeFigureOut">
               <a:rPr lang="it-IT" smtClean="0"/>
-              <a:t>11/09/2022</a:t>
+              <a:t>01/10/2023</a:t>
             </a:fld>
             <a:endParaRPr lang="it-IT" dirty="0"/>
           </a:p>
@@ -3621,36 +3718,6 @@
           </a:p>
         </p:txBody>
       </p:sp>
-      <p:pic>
-        <p:nvPicPr>
-          <p:cNvPr id="8" name="Picture 7">
-            <a:extLst>
-              <a:ext uri="{FF2B5EF4-FFF2-40B4-BE49-F238E27FC236}">
-                <a16:creationId xmlns:a16="http://schemas.microsoft.com/office/drawing/2014/main" id="{081DDD2C-BB40-C473-7382-DA91D9BE0335}"/>
-              </a:ext>
-            </a:extLst>
-          </p:cNvPr>
-          <p:cNvPicPr>
-            <a:picLocks noChangeAspect="1"/>
-          </p:cNvPicPr>
-          <p:nvPr/>
-        </p:nvPicPr>
-        <p:blipFill>
-          <a:blip r:embed="rId2"/>
-          <a:stretch>
-            <a:fillRect/>
-          </a:stretch>
-        </p:blipFill>
-        <p:spPr>
-          <a:xfrm>
-            <a:off x="2893218" y="3351748"/>
-            <a:ext cx="9765109" cy="4564393"/>
-          </a:xfrm>
-          <a:prstGeom prst="rect">
-            <a:avLst/>
-          </a:prstGeom>
-        </p:spPr>
-      </p:pic>
       <p:sp>
         <p:nvSpPr>
           <p:cNvPr id="9" name="TextBox 8">
@@ -3688,7 +3755,7 @@
             <a:r>
               <a:rPr lang="en-US" b="0" dirty="0">
                 <a:latin typeface="Avenir Black"/>
-                <a:hlinkClick r:id="rId3"/>
+                <a:hlinkClick r:id="rId2"/>
               </a:rPr>
               <a:t>Community Edition</a:t>
             </a:r>
@@ -3701,6 +3768,36 @@
           </a:p>
         </p:txBody>
       </p:sp>
+      <p:pic>
+        <p:nvPicPr>
+          <p:cNvPr id="7" name="Picture 6">
+            <a:extLst>
+              <a:ext uri="{FF2B5EF4-FFF2-40B4-BE49-F238E27FC236}">
+                <a16:creationId xmlns:a16="http://schemas.microsoft.com/office/drawing/2014/main" id="{64692D37-9040-C4D0-A675-14CCB050D24A}"/>
+              </a:ext>
+            </a:extLst>
+          </p:cNvPr>
+          <p:cNvPicPr>
+            <a:picLocks noChangeAspect="1"/>
+          </p:cNvPicPr>
+          <p:nvPr/>
+        </p:nvPicPr>
+        <p:blipFill>
+          <a:blip r:embed="rId3"/>
+          <a:stretch>
+            <a:fillRect/>
+          </a:stretch>
+        </p:blipFill>
+        <p:spPr>
+          <a:xfrm>
+            <a:off x="2973721" y="2152367"/>
+            <a:ext cx="7895923" cy="6096307"/>
+          </a:xfrm>
+          <a:prstGeom prst="rect">
+            <a:avLst/>
+          </a:prstGeom>
+        </p:spPr>
+      </p:pic>
     </p:spTree>
     <p:extLst>
       <p:ext uri="{BB962C8B-B14F-4D97-AF65-F5344CB8AC3E}">
@@ -3715,6 +3812,219 @@
 </file>
 
 <file path=ppt/slides/slide13.xml><?xml version="1.0" encoding="utf-8"?>
+<p:sld xmlns:a="http://schemas.openxmlformats.org/drawingml/2006/main" xmlns:r="http://schemas.openxmlformats.org/officeDocument/2006/relationships" xmlns:p="http://schemas.openxmlformats.org/presentationml/2006/main">
+  <p:cSld>
+    <p:spTree>
+      <p:nvGrpSpPr>
+        <p:cNvPr id="1" name=""/>
+        <p:cNvGrpSpPr/>
+        <p:nvPr/>
+      </p:nvGrpSpPr>
+      <p:grpSpPr>
+        <a:xfrm>
+          <a:off x="0" y="0"/>
+          <a:ext cx="0" cy="0"/>
+          <a:chOff x="0" y="0"/>
+          <a:chExt cx="0" cy="0"/>
+        </a:xfrm>
+      </p:grpSpPr>
+      <p:sp>
+        <p:nvSpPr>
+          <p:cNvPr id="2" name="Text Placeholder 1">
+            <a:extLst>
+              <a:ext uri="{FF2B5EF4-FFF2-40B4-BE49-F238E27FC236}">
+                <a16:creationId xmlns:a16="http://schemas.microsoft.com/office/drawing/2014/main" id="{D046E1A7-E6CE-750B-A1E8-60E037A8BAC5}"/>
+              </a:ext>
+            </a:extLst>
+          </p:cNvPr>
+          <p:cNvSpPr>
+            <a:spLocks noGrp="1"/>
+          </p:cNvSpPr>
+          <p:nvPr>
+            <p:ph type="body" sz="quarter" idx="15"/>
+          </p:nvPr>
+        </p:nvSpPr>
+        <p:spPr/>
+        <p:txBody>
+          <a:bodyPr/>
+          <a:lstStyle/>
+          <a:p>
+            <a:endParaRPr lang="en-US"/>
+          </a:p>
+        </p:txBody>
+      </p:sp>
+      <p:sp>
+        <p:nvSpPr>
+          <p:cNvPr id="3" name="Text Placeholder 2">
+            <a:extLst>
+              <a:ext uri="{FF2B5EF4-FFF2-40B4-BE49-F238E27FC236}">
+                <a16:creationId xmlns:a16="http://schemas.microsoft.com/office/drawing/2014/main" id="{378ECCDB-5969-B31A-B03F-4E076826B87B}"/>
+              </a:ext>
+            </a:extLst>
+          </p:cNvPr>
+          <p:cNvSpPr>
+            <a:spLocks noGrp="1"/>
+          </p:cNvSpPr>
+          <p:nvPr>
+            <p:ph type="body" sz="quarter" idx="17"/>
+          </p:nvPr>
+        </p:nvSpPr>
+        <p:spPr/>
+        <p:txBody>
+          <a:bodyPr/>
+          <a:lstStyle/>
+          <a:p>
+            <a:endParaRPr lang="en-US"/>
+          </a:p>
+        </p:txBody>
+      </p:sp>
+      <p:sp>
+        <p:nvSpPr>
+          <p:cNvPr id="4" name="Text Placeholder 3">
+            <a:extLst>
+              <a:ext uri="{FF2B5EF4-FFF2-40B4-BE49-F238E27FC236}">
+                <a16:creationId xmlns:a16="http://schemas.microsoft.com/office/drawing/2014/main" id="{E30E15C0-FEDC-5D28-85E9-641EF6E6B82A}"/>
+              </a:ext>
+            </a:extLst>
+          </p:cNvPr>
+          <p:cNvSpPr>
+            <a:spLocks noGrp="1"/>
+          </p:cNvSpPr>
+          <p:nvPr>
+            <p:ph type="body" sz="quarter" idx="16"/>
+          </p:nvPr>
+        </p:nvSpPr>
+        <p:spPr/>
+        <p:txBody>
+          <a:bodyPr/>
+          <a:lstStyle/>
+          <a:p>
+            <a:endParaRPr lang="en-US"/>
+          </a:p>
+        </p:txBody>
+      </p:sp>
+      <p:sp>
+        <p:nvSpPr>
+          <p:cNvPr id="5" name="Title 4">
+            <a:extLst>
+              <a:ext uri="{FF2B5EF4-FFF2-40B4-BE49-F238E27FC236}">
+                <a16:creationId xmlns:a16="http://schemas.microsoft.com/office/drawing/2014/main" id="{5CA0E81E-EB36-F7EF-A310-B1FE006EB5EE}"/>
+              </a:ext>
+            </a:extLst>
+          </p:cNvPr>
+          <p:cNvSpPr>
+            <a:spLocks noGrp="1"/>
+          </p:cNvSpPr>
+          <p:nvPr>
+            <p:ph type="title"/>
+          </p:nvPr>
+        </p:nvSpPr>
+        <p:spPr/>
+        <p:txBody>
+          <a:bodyPr/>
+          <a:lstStyle/>
+          <a:p>
+            <a:r>
+              <a:rPr lang="en-US" dirty="0"/>
+              <a:t>Setup Databricks Community</a:t>
+            </a:r>
+          </a:p>
+        </p:txBody>
+      </p:sp>
+      <p:sp>
+        <p:nvSpPr>
+          <p:cNvPr id="9" name="TextBox 8">
+            <a:extLst>
+              <a:ext uri="{FF2B5EF4-FFF2-40B4-BE49-F238E27FC236}">
+                <a16:creationId xmlns:a16="http://schemas.microsoft.com/office/drawing/2014/main" id="{6F897F41-FAD2-AA5C-343A-8A814B9EC400}"/>
+              </a:ext>
+            </a:extLst>
+          </p:cNvPr>
+          <p:cNvSpPr txBox="1"/>
+          <p:nvPr/>
+        </p:nvSpPr>
+        <p:spPr>
+          <a:xfrm>
+            <a:off x="512150" y="8357281"/>
+            <a:ext cx="4277133" cy="369332"/>
+          </a:xfrm>
+          <a:prstGeom prst="rect">
+            <a:avLst/>
+          </a:prstGeom>
+          <a:noFill/>
+        </p:spPr>
+        <p:txBody>
+          <a:bodyPr wrap="none" rtlCol="0">
+            <a:spAutoFit/>
+          </a:bodyPr>
+          <a:lstStyle/>
+          <a:p>
+            <a:r>
+              <a:rPr lang="en-US" b="0" dirty="0">
+                <a:latin typeface="Avenir Black"/>
+              </a:rPr>
+              <a:t>Guide: create a </a:t>
+            </a:r>
+            <a:r>
+              <a:rPr lang="en-US" b="0" dirty="0">
+                <a:latin typeface="Avenir Black"/>
+                <a:hlinkClick r:id="rId2"/>
+              </a:rPr>
+              <a:t>Community Edition</a:t>
+            </a:r>
+            <a:r>
+              <a:rPr lang="en-US" b="0" dirty="0">
+                <a:latin typeface="Avenir Black"/>
+              </a:rPr>
+              <a:t> account</a:t>
+            </a:r>
+          </a:p>
+        </p:txBody>
+      </p:sp>
+      <p:pic>
+        <p:nvPicPr>
+          <p:cNvPr id="8" name="Picture 7">
+            <a:extLst>
+              <a:ext uri="{FF2B5EF4-FFF2-40B4-BE49-F238E27FC236}">
+                <a16:creationId xmlns:a16="http://schemas.microsoft.com/office/drawing/2014/main" id="{1A5A774D-01F7-45B1-F12E-43C881799B5B}"/>
+              </a:ext>
+            </a:extLst>
+          </p:cNvPr>
+          <p:cNvPicPr>
+            <a:picLocks noChangeAspect="1"/>
+          </p:cNvPicPr>
+          <p:nvPr/>
+        </p:nvPicPr>
+        <p:blipFill>
+          <a:blip r:embed="rId3"/>
+          <a:stretch>
+            <a:fillRect/>
+          </a:stretch>
+        </p:blipFill>
+        <p:spPr>
+          <a:xfrm>
+            <a:off x="0" y="2008394"/>
+            <a:ext cx="13004800" cy="5736812"/>
+          </a:xfrm>
+          <a:prstGeom prst="rect">
+            <a:avLst/>
+          </a:prstGeom>
+        </p:spPr>
+      </p:pic>
+    </p:spTree>
+    <p:extLst>
+      <p:ext uri="{BB962C8B-B14F-4D97-AF65-F5344CB8AC3E}">
+        <p14:creationId xmlns:p14="http://schemas.microsoft.com/office/powerpoint/2010/main" val="123924991"/>
+      </p:ext>
+    </p:extLst>
+  </p:cSld>
+  <p:clrMapOvr>
+    <a:masterClrMapping/>
+  </p:clrMapOvr>
+</p:sld>
+</file>
+
+<file path=ppt/slides/slide14.xml><?xml version="1.0" encoding="utf-8"?>
 <p:sld xmlns:a="http://schemas.openxmlformats.org/drawingml/2006/main" xmlns:r="http://schemas.openxmlformats.org/officeDocument/2006/relationships" xmlns:p="http://schemas.openxmlformats.org/presentationml/2006/main">
   <p:cSld>
     <p:spTree>
@@ -3950,7 +4260,7 @@
 </p:sld>
 </file>
 
-<file path=ppt/slides/slide14.xml><?xml version="1.0" encoding="utf-8"?>
+<file path=ppt/slides/slide15.xml><?xml version="1.0" encoding="utf-8"?>
 <p:sld xmlns:a="http://schemas.openxmlformats.org/drawingml/2006/main" xmlns:r="http://schemas.openxmlformats.org/officeDocument/2006/relationships" xmlns:p="http://schemas.openxmlformats.org/presentationml/2006/main">
   <p:cSld>
     <p:spTree>
@@ -4072,10 +4382,10 @@
       </p:sp>
       <p:pic>
         <p:nvPicPr>
-          <p:cNvPr id="8" name="Picture 7">
-            <a:extLst>
-              <a:ext uri="{FF2B5EF4-FFF2-40B4-BE49-F238E27FC236}">
-                <a16:creationId xmlns:a16="http://schemas.microsoft.com/office/drawing/2014/main" id="{AD13B4F9-472C-ADD3-AFCA-463F5B97AD67}"/>
+          <p:cNvPr id="7" name="Picture 6">
+            <a:extLst>
+              <a:ext uri="{FF2B5EF4-FFF2-40B4-BE49-F238E27FC236}">
+                <a16:creationId xmlns:a16="http://schemas.microsoft.com/office/drawing/2014/main" id="{F6ECD900-D6F7-3029-FC0D-3D63DF2ED984}"/>
               </a:ext>
             </a:extLst>
           </p:cNvPr>
@@ -4092,118 +4402,14 @@
         </p:blipFill>
         <p:spPr>
           <a:xfrm>
-            <a:off x="4560555" y="2137803"/>
-            <a:ext cx="3883690" cy="5965590"/>
+            <a:off x="4354497" y="2069530"/>
+            <a:ext cx="4295806" cy="6162720"/>
           </a:xfrm>
           <a:prstGeom prst="rect">
             <a:avLst/>
           </a:prstGeom>
         </p:spPr>
       </p:pic>
-      <p:sp>
-        <p:nvSpPr>
-          <p:cNvPr id="11" name="Oval 10">
-            <a:extLst>
-              <a:ext uri="{FF2B5EF4-FFF2-40B4-BE49-F238E27FC236}">
-                <a16:creationId xmlns:a16="http://schemas.microsoft.com/office/drawing/2014/main" id="{7C900FAA-835C-23A0-8855-643615C4E330}"/>
-              </a:ext>
-            </a:extLst>
-          </p:cNvPr>
-          <p:cNvSpPr/>
-          <p:nvPr/>
-        </p:nvSpPr>
-        <p:spPr>
-          <a:xfrm>
-            <a:off x="4704312" y="4324175"/>
-            <a:ext cx="1325012" cy="620035"/>
-          </a:xfrm>
-          <a:prstGeom prst="ellipse">
-            <a:avLst/>
-          </a:prstGeom>
-          <a:noFill/>
-          <a:ln w="76200">
-            <a:solidFill>
-              <a:schemeClr val="accent6"/>
-            </a:solidFill>
-          </a:ln>
-        </p:spPr>
-        <p:style>
-          <a:lnRef idx="2">
-            <a:schemeClr val="accent1">
-              <a:shade val="50000"/>
-            </a:schemeClr>
-          </a:lnRef>
-          <a:fillRef idx="1">
-            <a:schemeClr val="accent1"/>
-          </a:fillRef>
-          <a:effectRef idx="0">
-            <a:schemeClr val="accent1"/>
-          </a:effectRef>
-          <a:fontRef idx="minor">
-            <a:schemeClr val="lt1"/>
-          </a:fontRef>
-        </p:style>
-        <p:txBody>
-          <a:bodyPr rtlCol="0" anchor="ctr"/>
-          <a:lstStyle/>
-          <a:p>
-            <a:pPr algn="ctr"/>
-            <a:endParaRPr lang="en-US"/>
-          </a:p>
-        </p:txBody>
-      </p:sp>
-      <p:sp>
-        <p:nvSpPr>
-          <p:cNvPr id="12" name="Oval 11">
-            <a:extLst>
-              <a:ext uri="{FF2B5EF4-FFF2-40B4-BE49-F238E27FC236}">
-                <a16:creationId xmlns:a16="http://schemas.microsoft.com/office/drawing/2014/main" id="{6CC0FFDF-0A9A-F63F-6303-70F59F3FC444}"/>
-              </a:ext>
-            </a:extLst>
-          </p:cNvPr>
-          <p:cNvSpPr/>
-          <p:nvPr/>
-        </p:nvSpPr>
-        <p:spPr>
-          <a:xfrm>
-            <a:off x="4411419" y="3713735"/>
-            <a:ext cx="1325012" cy="620035"/>
-          </a:xfrm>
-          <a:prstGeom prst="ellipse">
-            <a:avLst/>
-          </a:prstGeom>
-          <a:noFill/>
-          <a:ln w="76200">
-            <a:solidFill>
-              <a:schemeClr val="accent6"/>
-            </a:solidFill>
-          </a:ln>
-        </p:spPr>
-        <p:style>
-          <a:lnRef idx="2">
-            <a:schemeClr val="accent1">
-              <a:shade val="50000"/>
-            </a:schemeClr>
-          </a:lnRef>
-          <a:fillRef idx="1">
-            <a:schemeClr val="accent1"/>
-          </a:fillRef>
-          <a:effectRef idx="0">
-            <a:schemeClr val="accent1"/>
-          </a:effectRef>
-          <a:fontRef idx="minor">
-            <a:schemeClr val="lt1"/>
-          </a:fontRef>
-        </p:style>
-        <p:txBody>
-          <a:bodyPr rtlCol="0" anchor="ctr"/>
-          <a:lstStyle/>
-          <a:p>
-            <a:pPr algn="ctr"/>
-            <a:endParaRPr lang="en-US"/>
-          </a:p>
-        </p:txBody>
-      </p:sp>
     </p:spTree>
     <p:extLst>
       <p:ext uri="{BB962C8B-B14F-4D97-AF65-F5344CB8AC3E}">
@@ -4217,7 +4423,7 @@
 </p:sld>
 </file>
 
-<file path=ppt/slides/slide15.xml><?xml version="1.0" encoding="utf-8"?>
+<file path=ppt/slides/slide16.xml><?xml version="1.0" encoding="utf-8"?>
 <p:sld xmlns:a="http://schemas.openxmlformats.org/drawingml/2006/main" xmlns:r="http://schemas.openxmlformats.org/officeDocument/2006/relationships" xmlns:p="http://schemas.openxmlformats.org/presentationml/2006/main">
   <p:cSld>
     <p:spTree>
@@ -4236,10 +4442,10 @@
       </p:grpSpPr>
       <p:pic>
         <p:nvPicPr>
-          <p:cNvPr id="7" name="Picture 6">
-            <a:extLst>
-              <a:ext uri="{FF2B5EF4-FFF2-40B4-BE49-F238E27FC236}">
-                <a16:creationId xmlns:a16="http://schemas.microsoft.com/office/drawing/2014/main" id="{28DB1D77-A3DA-D4B4-57AF-A2D1772D5718}"/>
+          <p:cNvPr id="8" name="Picture 7">
+            <a:extLst>
+              <a:ext uri="{FF2B5EF4-FFF2-40B4-BE49-F238E27FC236}">
+                <a16:creationId xmlns:a16="http://schemas.microsoft.com/office/drawing/2014/main" id="{F1F1A211-B3BC-62CF-2072-6F4A76716D01}"/>
               </a:ext>
             </a:extLst>
           </p:cNvPr>
@@ -4256,8 +4462,8 @@
         </p:blipFill>
         <p:spPr>
           <a:xfrm>
-            <a:off x="4361684" y="2100263"/>
-            <a:ext cx="3721612" cy="6646067"/>
+            <a:off x="4268046" y="1889652"/>
+            <a:ext cx="4468708" cy="6533990"/>
           </a:xfrm>
           <a:prstGeom prst="rect">
             <a:avLst/>
@@ -4469,7 +4675,7 @@
 </p:sld>
 </file>
 
-<file path=ppt/slides/slide16.xml><?xml version="1.0" encoding="utf-8"?>
+<file path=ppt/slides/slide17.xml><?xml version="1.0" encoding="utf-8"?>
 <p:sld xmlns:a="http://schemas.openxmlformats.org/drawingml/2006/main" xmlns:r="http://schemas.openxmlformats.org/officeDocument/2006/relationships" xmlns:p="http://schemas.openxmlformats.org/presentationml/2006/main">
   <p:cSld>
     <p:spTree>
@@ -4826,15 +5032,15 @@
             </a:r>
             <a:r>
               <a:rPr lang="en-US" dirty="0"/>
-              <a:t>: 44h dal 12 </a:t>
+              <a:t>: 48h dal 2 </a:t>
             </a:r>
             <a:r>
               <a:rPr lang="en-US" dirty="0" err="1"/>
-              <a:t>settembre</a:t>
+              <a:t>ottobre</a:t>
             </a:r>
             <a:r>
               <a:rPr lang="en-US" dirty="0"/>
-              <a:t> 2022 all’8 </a:t>
+              <a:t> 2023 al 16 </a:t>
             </a:r>
             <a:r>
               <a:rPr lang="en-US" dirty="0" err="1"/>
@@ -4842,7 +5048,7 @@
             </a:r>
             <a:r>
               <a:rPr lang="en-US" dirty="0"/>
-              <a:t> 2022</a:t>
+              <a:t> 2023</a:t>
             </a:r>
           </a:p>
         </p:txBody>
@@ -5015,11 +5221,11 @@
             </a:r>
             <a:r>
               <a:rPr lang="en-US" dirty="0"/>
-              <a:t>: 17 </a:t>
+              <a:t>: 2 </a:t>
             </a:r>
             <a:r>
               <a:rPr lang="en-US" dirty="0" err="1"/>
-              <a:t>ottobre</a:t>
+              <a:t>novembre</a:t>
             </a:r>
             <a:r>
               <a:rPr lang="en-US" dirty="0"/>
@@ -5033,7 +5239,7 @@
             </a:r>
             <a:r>
               <a:rPr lang="en-US" dirty="0"/>
-              <a:t> finale: 8 </a:t>
+              <a:t> finale: 16 </a:t>
             </a:r>
             <a:r>
               <a:rPr lang="en-US" dirty="0" err="1"/>
@@ -5298,16 +5504,15 @@
             <a:pPr lvl="1"/>
             <a:r>
               <a:rPr lang="it-IT" dirty="0"/>
-              <a:t>2021-23.BD (download)</a:t>
+              <a:t>2022-24.BD (download)</a:t>
             </a:r>
           </a:p>
           <a:p>
             <a:pPr lvl="1"/>
             <a:r>
               <a:rPr lang="it-IT" dirty="0"/>
-              <a:t>UFS08 - Metodologie e piattaforme di Big Data Analytics</a:t>
-            </a:r>
-            <a:endParaRPr lang="en-US" dirty="0"/>
+              <a:t>UFS17 - Big Data Analytics</a:t>
+            </a:r>
           </a:p>
           <a:p>
             <a:r>
@@ -5506,53 +5711,6 @@
       </p:sp>
       <p:pic>
         <p:nvPicPr>
-          <p:cNvPr id="7" name="Picture 2">
-            <a:extLst>
-              <a:ext uri="{FF2B5EF4-FFF2-40B4-BE49-F238E27FC236}">
-                <a16:creationId xmlns:a16="http://schemas.microsoft.com/office/drawing/2014/main" id="{247969C7-3673-8F5A-154C-F3B592414859}"/>
-              </a:ext>
-            </a:extLst>
-          </p:cNvPr>
-          <p:cNvPicPr>
-            <a:picLocks noChangeAspect="1" noChangeArrowheads="1"/>
-          </p:cNvPicPr>
-          <p:nvPr/>
-        </p:nvPicPr>
-        <p:blipFill>
-          <a:blip r:embed="rId2" cstate="print">
-            <a:extLst>
-              <a:ext uri="{28A0092B-C50C-407E-A947-70E740481C1C}">
-                <a14:useLocalDpi xmlns:a14="http://schemas.microsoft.com/office/drawing/2010/main" val="0"/>
-              </a:ext>
-            </a:extLst>
-          </a:blip>
-          <a:srcRect/>
-          <a:stretch>
-            <a:fillRect/>
-          </a:stretch>
-        </p:blipFill>
-        <p:spPr bwMode="auto">
-          <a:xfrm>
-            <a:off x="893763" y="3306781"/>
-            <a:ext cx="4449336" cy="2052257"/>
-          </a:xfrm>
-          <a:prstGeom prst="rect">
-            <a:avLst/>
-          </a:prstGeom>
-          <a:noFill/>
-          <a:extLst>
-            <a:ext uri="{909E8E84-426E-40DD-AFC4-6F175D3DCCD1}">
-              <a14:hiddenFill xmlns:a14="http://schemas.microsoft.com/office/drawing/2010/main">
-                <a:solidFill>
-                  <a:srgbClr val="FFFFFF"/>
-                </a:solidFill>
-              </a14:hiddenFill>
-            </a:ext>
-          </a:extLst>
-        </p:spPr>
-      </p:pic>
-      <p:pic>
-        <p:nvPicPr>
           <p:cNvPr id="10" name="Picture 9" descr="Icon&#10;&#10;Description automatically generated">
             <a:extLst>
               <a:ext uri="{FF2B5EF4-FFF2-40B4-BE49-F238E27FC236}">
@@ -5566,7 +5724,7 @@
           <p:nvPr/>
         </p:nvPicPr>
         <p:blipFill>
-          <a:blip r:embed="rId3" cstate="print">
+          <a:blip r:embed="rId2" cstate="print">
             <a:extLst>
               <a:ext uri="{28A0092B-C50C-407E-A947-70E740481C1C}">
                 <a14:useLocalDpi xmlns:a14="http://schemas.microsoft.com/office/drawing/2010/main" val="0"/>
@@ -5809,7 +5967,7 @@
               </a:r>
               <a:r>
                 <a:rPr lang="en-US" b="0" dirty="0">
-                  <a:hlinkClick r:id="rId4"/>
+                  <a:hlinkClick r:id="rId3"/>
                 </a:rPr>
                 <a:t>Python Milano</a:t>
               </a:r>
@@ -5832,7 +5990,7 @@
             <p:nvPr/>
           </p:nvPicPr>
           <p:blipFill>
-            <a:blip r:embed="rId5" cstate="print">
+            <a:blip r:embed="rId4" cstate="print">
               <a:extLst>
                 <a:ext uri="{28A0092B-C50C-407E-A947-70E740481C1C}">
                   <a14:useLocalDpi xmlns:a14="http://schemas.microsoft.com/office/drawing/2010/main" val="0"/>
@@ -6373,13 +6531,13 @@
               </a:r>
               <a:r>
                 <a:rPr lang="en-US" b="0" dirty="0" err="1">
-                  <a:hlinkClick r:id="rId6"/>
+                  <a:hlinkClick r:id="rId5"/>
                 </a:rPr>
                 <a:t>Intervista</a:t>
               </a:r>
               <a:r>
                 <a:rPr lang="en-US" b="0" dirty="0">
-                  <a:hlinkClick r:id="rId6"/>
+                  <a:hlinkClick r:id="rId5"/>
                 </a:rPr>
                 <a:t> Pythonista </a:t>
               </a:r>
@@ -6393,6 +6551,53 @@
               <a:extLst>
                 <a:ext uri="{FF2B5EF4-FFF2-40B4-BE49-F238E27FC236}">
                   <a16:creationId xmlns:a16="http://schemas.microsoft.com/office/drawing/2014/main" id="{C52BEAB0-611F-B4C1-7AC7-34642BDEDAB4}"/>
+                </a:ext>
+              </a:extLst>
+            </p:cNvPr>
+            <p:cNvPicPr>
+              <a:picLocks noChangeAspect="1" noChangeArrowheads="1"/>
+            </p:cNvPicPr>
+            <p:nvPr/>
+          </p:nvPicPr>
+          <p:blipFill>
+            <a:blip r:embed="rId6" cstate="print">
+              <a:extLst>
+                <a:ext uri="{28A0092B-C50C-407E-A947-70E740481C1C}">
+                  <a14:useLocalDpi xmlns:a14="http://schemas.microsoft.com/office/drawing/2010/main" val="0"/>
+                </a:ext>
+              </a:extLst>
+            </a:blip>
+            <a:srcRect/>
+            <a:stretch>
+              <a:fillRect/>
+            </a:stretch>
+          </p:blipFill>
+          <p:spPr bwMode="auto">
+            <a:xfrm>
+              <a:off x="9001899" y="3306781"/>
+              <a:ext cx="2680942" cy="2010706"/>
+            </a:xfrm>
+            <a:prstGeom prst="rect">
+              <a:avLst/>
+            </a:prstGeom>
+            <a:noFill/>
+            <a:extLst>
+              <a:ext uri="{909E8E84-426E-40DD-AFC4-6F175D3DCCD1}">
+                <a14:hiddenFill xmlns:a14="http://schemas.microsoft.com/office/drawing/2010/main">
+                  <a:solidFill>
+                    <a:srgbClr val="FFFFFF"/>
+                  </a:solidFill>
+                </a14:hiddenFill>
+              </a:ext>
+            </a:extLst>
+          </p:spPr>
+        </p:pic>
+        <p:pic>
+          <p:nvPicPr>
+            <p:cNvPr id="1028" name="Picture 4">
+              <a:extLst>
+                <a:ext uri="{FF2B5EF4-FFF2-40B4-BE49-F238E27FC236}">
+                  <a16:creationId xmlns:a16="http://schemas.microsoft.com/office/drawing/2014/main" id="{B3CFF99C-C900-6482-5211-F36AA5D744A7}"/>
                 </a:ext>
               </a:extLst>
             </p:cNvPr>
@@ -6416,8 +6621,8 @@
           </p:blipFill>
           <p:spPr bwMode="auto">
             <a:xfrm>
-              <a:off x="9001899" y="3306781"/>
-              <a:ext cx="2680942" cy="2010706"/>
+              <a:off x="10210548" y="6233890"/>
+              <a:ext cx="548640" cy="548640"/>
             </a:xfrm>
             <a:prstGeom prst="rect">
               <a:avLst/>
@@ -6436,10 +6641,10 @@
         </p:pic>
         <p:pic>
           <p:nvPicPr>
-            <p:cNvPr id="1028" name="Picture 4">
+            <p:cNvPr id="1030" name="Picture 6">
               <a:extLst>
                 <a:ext uri="{FF2B5EF4-FFF2-40B4-BE49-F238E27FC236}">
-                  <a16:creationId xmlns:a16="http://schemas.microsoft.com/office/drawing/2014/main" id="{B3CFF99C-C900-6482-5211-F36AA5D744A7}"/>
+                  <a16:creationId xmlns:a16="http://schemas.microsoft.com/office/drawing/2014/main" id="{97AEB66B-C263-4FAD-C99D-16F2ACE1C3CC}"/>
                 </a:ext>
               </a:extLst>
             </p:cNvPr>
@@ -6463,53 +6668,6 @@
           </p:blipFill>
           <p:spPr bwMode="auto">
             <a:xfrm>
-              <a:off x="10210548" y="6233890"/>
-              <a:ext cx="548640" cy="548640"/>
-            </a:xfrm>
-            <a:prstGeom prst="rect">
-              <a:avLst/>
-            </a:prstGeom>
-            <a:noFill/>
-            <a:extLst>
-              <a:ext uri="{909E8E84-426E-40DD-AFC4-6F175D3DCCD1}">
-                <a14:hiddenFill xmlns:a14="http://schemas.microsoft.com/office/drawing/2010/main">
-                  <a:solidFill>
-                    <a:srgbClr val="FFFFFF"/>
-                  </a:solidFill>
-                </a14:hiddenFill>
-              </a:ext>
-            </a:extLst>
-          </p:spPr>
-        </p:pic>
-        <p:pic>
-          <p:nvPicPr>
-            <p:cNvPr id="1030" name="Picture 6">
-              <a:extLst>
-                <a:ext uri="{FF2B5EF4-FFF2-40B4-BE49-F238E27FC236}">
-                  <a16:creationId xmlns:a16="http://schemas.microsoft.com/office/drawing/2014/main" id="{97AEB66B-C263-4FAD-C99D-16F2ACE1C3CC}"/>
-                </a:ext>
-              </a:extLst>
-            </p:cNvPr>
-            <p:cNvPicPr>
-              <a:picLocks noChangeAspect="1" noChangeArrowheads="1"/>
-            </p:cNvPicPr>
-            <p:nvPr/>
-          </p:nvPicPr>
-          <p:blipFill>
-            <a:blip r:embed="rId9" cstate="print">
-              <a:extLst>
-                <a:ext uri="{28A0092B-C50C-407E-A947-70E740481C1C}">
-                  <a14:useLocalDpi xmlns:a14="http://schemas.microsoft.com/office/drawing/2010/main" val="0"/>
-                </a:ext>
-              </a:extLst>
-            </a:blip>
-            <a:srcRect/>
-            <a:stretch>
-              <a:fillRect/>
-            </a:stretch>
-          </p:blipFill>
-          <p:spPr bwMode="auto">
-            <a:xfrm>
               <a:off x="10642860" y="6680832"/>
               <a:ext cx="548640" cy="548640"/>
             </a:xfrm>
@@ -6543,7 +6701,7 @@
             <p:nvPr/>
           </p:nvPicPr>
           <p:blipFill>
-            <a:blip r:embed="rId10" cstate="print">
+            <a:blip r:embed="rId9" cstate="print">
               <a:extLst>
                 <a:ext uri="{28A0092B-C50C-407E-A947-70E740481C1C}">
                   <a14:useLocalDpi xmlns:a14="http://schemas.microsoft.com/office/drawing/2010/main" val="0"/>
@@ -6794,7 +6952,7 @@
           <p:nvPr/>
         </p:nvPicPr>
         <p:blipFill>
-          <a:blip r:embed="rId11" cstate="print">
+          <a:blip r:embed="rId10" cstate="print">
             <a:extLst>
               <a:ext uri="{28A0092B-C50C-407E-A947-70E740481C1C}">
                 <a14:useLocalDpi xmlns:a14="http://schemas.microsoft.com/office/drawing/2010/main" val="0"/>
@@ -6841,7 +6999,7 @@
           <p:nvPr/>
         </p:nvPicPr>
         <p:blipFill>
-          <a:blip r:embed="rId12" cstate="print">
+          <a:blip r:embed="rId11" cstate="print">
             <a:extLst>
               <a:ext uri="{28A0092B-C50C-407E-A947-70E740481C1C}">
                 <a14:useLocalDpi xmlns:a14="http://schemas.microsoft.com/office/drawing/2010/main" val="0"/>
@@ -6888,7 +7046,7 @@
           <p:nvPr/>
         </p:nvPicPr>
         <p:blipFill rotWithShape="1">
-          <a:blip r:embed="rId13" cstate="print">
+          <a:blip r:embed="rId12" cstate="print">
             <a:extLst>
               <a:ext uri="{28A0092B-C50C-407E-A947-70E740481C1C}">
                 <a14:useLocalDpi xmlns:a14="http://schemas.microsoft.com/office/drawing/2010/main" val="0"/>
@@ -6902,6 +7060,53 @@
           <a:xfrm>
             <a:off x="3361512" y="7355046"/>
             <a:ext cx="1357952" cy="511227"/>
+          </a:xfrm>
+          <a:prstGeom prst="rect">
+            <a:avLst/>
+          </a:prstGeom>
+          <a:noFill/>
+          <a:extLst>
+            <a:ext uri="{909E8E84-426E-40DD-AFC4-6F175D3DCCD1}">
+              <a14:hiddenFill xmlns:a14="http://schemas.microsoft.com/office/drawing/2010/main">
+                <a:solidFill>
+                  <a:srgbClr val="FFFFFF"/>
+                </a:solidFill>
+              </a14:hiddenFill>
+            </a:ext>
+          </a:extLst>
+        </p:spPr>
+      </p:pic>
+      <p:pic>
+        <p:nvPicPr>
+          <p:cNvPr id="9" name="Picture 2">
+            <a:extLst>
+              <a:ext uri="{FF2B5EF4-FFF2-40B4-BE49-F238E27FC236}">
+                <a16:creationId xmlns:a16="http://schemas.microsoft.com/office/drawing/2014/main" id="{C645409E-C137-8BE9-746E-50C69E876117}"/>
+              </a:ext>
+            </a:extLst>
+          </p:cNvPr>
+          <p:cNvPicPr>
+            <a:picLocks noChangeAspect="1" noChangeArrowheads="1"/>
+          </p:cNvPicPr>
+          <p:nvPr/>
+        </p:nvPicPr>
+        <p:blipFill>
+          <a:blip r:embed="rId13" cstate="print">
+            <a:extLst>
+              <a:ext uri="{28A0092B-C50C-407E-A947-70E740481C1C}">
+                <a14:useLocalDpi xmlns:a14="http://schemas.microsoft.com/office/drawing/2010/main" val="0"/>
+              </a:ext>
+            </a:extLst>
+          </a:blip>
+          <a:srcRect/>
+          <a:stretch>
+            <a:fillRect/>
+          </a:stretch>
+        </p:blipFill>
+        <p:spPr bwMode="auto">
+          <a:xfrm>
+            <a:off x="1003455" y="3245502"/>
+            <a:ext cx="4038624" cy="2271726"/>
           </a:xfrm>
           <a:prstGeom prst="rect">
             <a:avLst/>
@@ -7564,7 +7769,7 @@
               <a:r>
                 <a:rPr lang="en-US" b="0" dirty="0">
                   <a:latin typeface="Avenir Black"/>
-                  <a:hlinkClick r:id="rId2"/>
+                  <a:hlinkClick r:id="rId3"/>
                 </a:rPr>
                 <a:t>Google Trends</a:t>
               </a:r>
@@ -7609,7 +7814,7 @@
               <p:nvPr/>
             </p:nvPicPr>
             <p:blipFill>
-              <a:blip r:embed="rId3"/>
+              <a:blip r:embed="rId4"/>
               <a:stretch>
                 <a:fillRect/>
               </a:stretch>
@@ -7696,7 +7901,7 @@
               <p:nvPr/>
             </p:nvPicPr>
             <p:blipFill>
-              <a:blip r:embed="rId4"/>
+              <a:blip r:embed="rId5"/>
               <a:stretch>
                 <a:fillRect/>
               </a:stretch>
@@ -7783,7 +7988,7 @@
               <p:nvPr/>
             </p:nvPicPr>
             <p:blipFill>
-              <a:blip r:embed="rId5"/>
+              <a:blip r:embed="rId6"/>
               <a:stretch>
                 <a:fillRect/>
               </a:stretch>
@@ -7870,7 +8075,7 @@
               <p:nvPr/>
             </p:nvPicPr>
             <p:blipFill>
-              <a:blip r:embed="rId6"/>
+              <a:blip r:embed="rId7"/>
               <a:stretch>
                 <a:fillRect/>
               </a:stretch>

</xml_diff>

<commit_message>
minor fix to notebook 3
</commit_message>
<xml_diff>
--- a/training-spark/0_Intro_v1.pptx
+++ b/training-spark/0_Intro_v1.pptx
@@ -446,7 +446,7 @@
           <a:p>
             <a:fld id="{154C1C9F-968B-45D4-9FBD-EA39F2175159}" type="datetimeFigureOut">
               <a:rPr lang="en-US" smtClean="0"/>
-              <a:t>2023-10-01</a:t>
+              <a:t>2023-10-02</a:t>
             </a:fld>
             <a:endParaRPr lang="en-US"/>
           </a:p>
@@ -1900,7 +1900,7 @@
           <a:p>
             <a:fld id="{0F1B7D9C-4F60-C246-8CA4-396C0346DE33}" type="datetimeFigureOut">
               <a:rPr lang="it-IT" smtClean="0"/>
-              <a:t>01/10/2023</a:t>
+              <a:t>02/10/2023</a:t>
             </a:fld>
             <a:endParaRPr lang="it-IT"/>
           </a:p>
@@ -2555,7 +2555,7 @@
           <a:p>
             <a:fld id="{A2FF5F4A-4507-894B-98D1-9441DD15C475}" type="datetimeFigureOut">
               <a:rPr lang="it-IT" smtClean="0"/>
-              <a:t>01/10/2023</a:t>
+              <a:t>02/10/2023</a:t>
             </a:fld>
             <a:endParaRPr lang="it-IT" dirty="0"/>
           </a:p>
@@ -5221,15 +5221,15 @@
             </a:r>
             <a:r>
               <a:rPr lang="en-US" dirty="0"/>
-              <a:t>: 2 </a:t>
+              <a:t>: 26 </a:t>
             </a:r>
             <a:r>
               <a:rPr lang="en-US" dirty="0" err="1"/>
-              <a:t>novembre</a:t>
+              <a:t>ottobre</a:t>
             </a:r>
             <a:r>
               <a:rPr lang="en-US" dirty="0"/>
-              <a:t> (40%)</a:t>
+              <a:t>(40%)</a:t>
             </a:r>
           </a:p>
           <a:p>

</xml_diff>